<commit_message>
Updated README.md and Slides
</commit_message>
<xml_diff>
--- a/slides/AWS-EKS-Pipeline-QuickStart.pptx
+++ b/slides/AWS-EKS-Pipeline-QuickStart.pptx
@@ -5,22 +5,24 @@
     <p:sldMasterId id="2147483852" r:id="rId1"/>
   </p:sldMasterIdLst>
   <p:notesMasterIdLst>
-    <p:notesMasterId r:id="rId12"/>
+    <p:notesMasterId r:id="rId14"/>
   </p:notesMasterIdLst>
   <p:handoutMasterIdLst>
-    <p:handoutMasterId r:id="rId13"/>
+    <p:handoutMasterId r:id="rId15"/>
   </p:handoutMasterIdLst>
   <p:sldIdLst>
     <p:sldId id="256" r:id="rId2"/>
     <p:sldId id="258" r:id="rId3"/>
     <p:sldId id="270" r:id="rId4"/>
-    <p:sldId id="266" r:id="rId5"/>
-    <p:sldId id="267" r:id="rId6"/>
-    <p:sldId id="262" r:id="rId7"/>
-    <p:sldId id="272" r:id="rId8"/>
-    <p:sldId id="273" r:id="rId9"/>
-    <p:sldId id="268" r:id="rId10"/>
-    <p:sldId id="265" r:id="rId11"/>
+    <p:sldId id="274" r:id="rId5"/>
+    <p:sldId id="275" r:id="rId6"/>
+    <p:sldId id="266" r:id="rId7"/>
+    <p:sldId id="267" r:id="rId8"/>
+    <p:sldId id="262" r:id="rId9"/>
+    <p:sldId id="272" r:id="rId10"/>
+    <p:sldId id="273" r:id="rId11"/>
+    <p:sldId id="268" r:id="rId12"/>
+    <p:sldId id="265" r:id="rId13"/>
   </p:sldIdLst>
   <p:sldSz cx="9144000" cy="6858000" type="screen4x3"/>
   <p:notesSz cx="6858000" cy="9144000"/>
@@ -205,7 +207,7 @@
             <a:fld id="{814910AB-AEF0-414C-82CB-791080B1186B}" type="datetimeFigureOut">
               <a:rPr lang="en-US" smtClean="0"/>
               <a:pPr/>
-              <a:t>2/3/2019</a:t>
+              <a:t>2/5/2019</a:t>
             </a:fld>
             <a:endParaRPr lang="en-US" dirty="0"/>
           </a:p>
@@ -372,7 +374,7 @@
             <a:fld id="{5B4AE38D-E020-46F3-803D-8636C5B7B74E}" type="datetimeFigureOut">
               <a:rPr lang="en-US" smtClean="0"/>
               <a:pPr/>
-              <a:t>2/3/2019</a:t>
+              <a:t>2/5/2019</a:t>
             </a:fld>
             <a:endParaRPr lang="en-US" dirty="0"/>
           </a:p>
@@ -714,7 +716,7 @@
             <a:fld id="{74DE7DC8-A302-4EFB-9208-987A80C71CE4}" type="slidenum">
               <a:rPr lang="en-US" smtClean="0"/>
               <a:pPr/>
-              <a:t>6</a:t>
+              <a:t>8</a:t>
             </a:fld>
             <a:endParaRPr lang="en-US" dirty="0"/>
           </a:p>
@@ -799,7 +801,7 @@
             <a:fld id="{74DE7DC8-A302-4EFB-9208-987A80C71CE4}" type="slidenum">
               <a:rPr lang="en-US" smtClean="0"/>
               <a:pPr/>
-              <a:t>7</a:t>
+              <a:t>9</a:t>
             </a:fld>
             <a:endParaRPr lang="en-US" dirty="0"/>
           </a:p>
@@ -884,7 +886,7 @@
             <a:fld id="{74DE7DC8-A302-4EFB-9208-987A80C71CE4}" type="slidenum">
               <a:rPr lang="en-US" smtClean="0"/>
               <a:pPr/>
-              <a:t>8</a:t>
+              <a:t>10</a:t>
             </a:fld>
             <a:endParaRPr lang="en-US" dirty="0"/>
           </a:p>
@@ -1080,7 +1082,7 @@
             <a:fld id="{7DDB771E-4AED-4DD3-8AA1-5D9FD2224F14}" type="datetimeFigureOut">
               <a:rPr lang="en-US" smtClean="0"/>
               <a:pPr/>
-              <a:t>2/3/2019</a:t>
+              <a:t>2/5/2019</a:t>
             </a:fld>
             <a:endParaRPr lang="en-US" dirty="0"/>
           </a:p>
@@ -1247,7 +1249,7 @@
             <a:fld id="{7DDB771E-4AED-4DD3-8AA1-5D9FD2224F14}" type="datetimeFigureOut">
               <a:rPr lang="en-US" smtClean="0"/>
               <a:pPr/>
-              <a:t>2/3/2019</a:t>
+              <a:t>2/5/2019</a:t>
             </a:fld>
             <a:endParaRPr lang="en-US" dirty="0"/>
           </a:p>
@@ -1424,7 +1426,7 @@
             <a:fld id="{7DDB771E-4AED-4DD3-8AA1-5D9FD2224F14}" type="datetimeFigureOut">
               <a:rPr lang="en-US" smtClean="0"/>
               <a:pPr/>
-              <a:t>2/3/2019</a:t>
+              <a:t>2/5/2019</a:t>
             </a:fld>
             <a:endParaRPr lang="en-US" dirty="0"/>
           </a:p>
@@ -1591,7 +1593,7 @@
             <a:fld id="{7DDB771E-4AED-4DD3-8AA1-5D9FD2224F14}" type="datetimeFigureOut">
               <a:rPr lang="en-US" smtClean="0"/>
               <a:pPr/>
-              <a:t>2/3/2019</a:t>
+              <a:t>2/5/2019</a:t>
             </a:fld>
             <a:endParaRPr lang="en-US" dirty="0"/>
           </a:p>
@@ -1834,7 +1836,7 @@
             <a:fld id="{7DDB771E-4AED-4DD3-8AA1-5D9FD2224F14}" type="datetimeFigureOut">
               <a:rPr lang="en-US" smtClean="0"/>
               <a:pPr/>
-              <a:t>2/3/2019</a:t>
+              <a:t>2/5/2019</a:t>
             </a:fld>
             <a:endParaRPr lang="en-US" dirty="0"/>
           </a:p>
@@ -2119,7 +2121,7 @@
             <a:fld id="{7DDB771E-4AED-4DD3-8AA1-5D9FD2224F14}" type="datetimeFigureOut">
               <a:rPr lang="en-US" smtClean="0"/>
               <a:pPr/>
-              <a:t>2/3/2019</a:t>
+              <a:t>2/5/2019</a:t>
             </a:fld>
             <a:endParaRPr lang="en-US" dirty="0"/>
           </a:p>
@@ -2538,7 +2540,7 @@
             <a:fld id="{7DDB771E-4AED-4DD3-8AA1-5D9FD2224F14}" type="datetimeFigureOut">
               <a:rPr lang="en-US" smtClean="0"/>
               <a:pPr/>
-              <a:t>2/3/2019</a:t>
+              <a:t>2/5/2019</a:t>
             </a:fld>
             <a:endParaRPr lang="en-US" dirty="0"/>
           </a:p>
@@ -2653,7 +2655,7 @@
             <a:fld id="{7DDB771E-4AED-4DD3-8AA1-5D9FD2224F14}" type="datetimeFigureOut">
               <a:rPr lang="en-US" smtClean="0"/>
               <a:pPr/>
-              <a:t>2/3/2019</a:t>
+              <a:t>2/5/2019</a:t>
             </a:fld>
             <a:endParaRPr lang="en-US" dirty="0"/>
           </a:p>
@@ -2745,7 +2747,7 @@
             <a:fld id="{7DDB771E-4AED-4DD3-8AA1-5D9FD2224F14}" type="datetimeFigureOut">
               <a:rPr lang="en-US" smtClean="0"/>
               <a:pPr/>
-              <a:t>2/3/2019</a:t>
+              <a:t>2/5/2019</a:t>
             </a:fld>
             <a:endParaRPr lang="en-US" dirty="0"/>
           </a:p>
@@ -3019,7 +3021,7 @@
             <a:fld id="{7DDB771E-4AED-4DD3-8AA1-5D9FD2224F14}" type="datetimeFigureOut">
               <a:rPr lang="en-US" smtClean="0"/>
               <a:pPr/>
-              <a:t>2/3/2019</a:t>
+              <a:t>2/5/2019</a:t>
             </a:fld>
             <a:endParaRPr lang="en-US" dirty="0"/>
           </a:p>
@@ -3269,7 +3271,7 @@
             <a:fld id="{7DDB771E-4AED-4DD3-8AA1-5D9FD2224F14}" type="datetimeFigureOut">
               <a:rPr lang="en-US" smtClean="0"/>
               <a:pPr/>
-              <a:t>2/3/2019</a:t>
+              <a:t>2/5/2019</a:t>
             </a:fld>
             <a:endParaRPr lang="en-US" dirty="0"/>
           </a:p>
@@ -3479,7 +3481,7 @@
             <a:fld id="{7DDB771E-4AED-4DD3-8AA1-5D9FD2224F14}" type="datetimeFigureOut">
               <a:rPr lang="en-US" smtClean="0"/>
               <a:pPr/>
-              <a:t>2/3/2019</a:t>
+              <a:t>2/5/2019</a:t>
             </a:fld>
             <a:endParaRPr lang="en-US" dirty="0"/>
           </a:p>
@@ -3889,7 +3891,7 @@
         <p:spPr>
           <a:xfrm>
             <a:off x="2875733" y="3257698"/>
-            <a:ext cx="2951754" cy="1200329"/>
+            <a:ext cx="2951754" cy="646331"/>
           </a:xfrm>
           <a:prstGeom prst="rect">
             <a:avLst/>
@@ -3904,32 +3906,16 @@
           <a:p>
             <a:pPr algn="ctr"/>
             <a:r>
-              <a:rPr lang="en-US" dirty="0"/>
-              <a:t>K</a:t>
-            </a:r>
-            <a:r>
-              <a:rPr lang="en-US" dirty="0" smtClean="0"/>
-              <a:t>irk Kalvar, KAL Technology</a:t>
+              <a:rPr lang="en-US" dirty="0" smtClean="0"/>
+              <a:t>kirk.kalvar@kal.technology</a:t>
             </a:r>
           </a:p>
           <a:p>
             <a:pPr algn="ctr"/>
-            <a:endParaRPr lang="en-US" dirty="0" smtClean="0"/>
-          </a:p>
-          <a:p>
-            <a:pPr algn="ctr"/>
-            <a:r>
-              <a:rPr lang="en-US" dirty="0" smtClean="0"/>
-              <a:t>kirk.kalvar@kal.technology</a:t>
-            </a:r>
-          </a:p>
-          <a:p>
-            <a:pPr algn="ctr"/>
             <a:r>
               <a:rPr lang="en-US" dirty="0" smtClean="0"/>
               <a:t>@kskalvar</a:t>
             </a:r>
-            <a:endParaRPr lang="en-US" dirty="0" smtClean="0"/>
           </a:p>
         </p:txBody>
       </p:sp>
@@ -4028,6 +4014,264 @@
       </p:grpSpPr>
       <p:sp>
         <p:nvSpPr>
+          <p:cNvPr id="3" name="Title 1"/>
+          <p:cNvSpPr>
+            <a:spLocks noGrp="1"/>
+          </p:cNvSpPr>
+          <p:nvPr>
+            <p:ph type="title"/>
+          </p:nvPr>
+        </p:nvSpPr>
+        <p:spPr/>
+        <p:txBody>
+          <a:bodyPr/>
+          <a:lstStyle/>
+          <a:p>
+            <a:r>
+              <a:rPr lang="en-US" dirty="0" smtClean="0"/>
+              <a:t>Conclusions</a:t>
+            </a:r>
+            <a:endParaRPr lang="en-US" dirty="0"/>
+          </a:p>
+        </p:txBody>
+      </p:sp>
+      <p:sp>
+        <p:nvSpPr>
+          <p:cNvPr id="5" name="TextBox 4"/>
+          <p:cNvSpPr txBox="1"/>
+          <p:nvPr/>
+        </p:nvSpPr>
+        <p:spPr>
+          <a:xfrm>
+            <a:off x="757367" y="1584186"/>
+            <a:ext cx="7515090" cy="2585323"/>
+          </a:xfrm>
+          <a:prstGeom prst="rect">
+            <a:avLst/>
+          </a:prstGeom>
+          <a:noFill/>
+        </p:spPr>
+        <p:txBody>
+          <a:bodyPr wrap="square" rtlCol="0">
+            <a:spAutoFit/>
+          </a:bodyPr>
+          <a:lstStyle/>
+          <a:p>
+            <a:pPr>
+              <a:buFont typeface="Arial" pitchFamily="34" charset="0"/>
+              <a:buChar char="•"/>
+            </a:pPr>
+            <a:r>
+              <a:rPr lang="en-US" dirty="0" smtClean="0"/>
+              <a:t>  Cons</a:t>
+            </a:r>
+          </a:p>
+          <a:p>
+            <a:pPr lvl="1">
+              <a:buFont typeface="Arial" pitchFamily="34" charset="0"/>
+              <a:buChar char="•"/>
+            </a:pPr>
+            <a:r>
+              <a:rPr lang="en-US" dirty="0"/>
+              <a:t> </a:t>
+            </a:r>
+            <a:r>
+              <a:rPr lang="en-US" dirty="0" smtClean="0"/>
+              <a:t> This pipeline does not currently support Development Teams</a:t>
+            </a:r>
+          </a:p>
+          <a:p>
+            <a:pPr lvl="1">
+              <a:buFont typeface="Arial" pitchFamily="34" charset="0"/>
+              <a:buChar char="•"/>
+            </a:pPr>
+            <a:r>
+              <a:rPr lang="en-US" dirty="0"/>
+              <a:t> </a:t>
+            </a:r>
+            <a:r>
+              <a:rPr lang="en-US" dirty="0" smtClean="0"/>
+              <a:t> This pipeline does not currently support a Complex Delivery Process</a:t>
+            </a:r>
+          </a:p>
+          <a:p>
+            <a:pPr lvl="1">
+              <a:buFont typeface="Arial" pitchFamily="34" charset="0"/>
+              <a:buChar char="•"/>
+            </a:pPr>
+            <a:r>
+              <a:rPr lang="en-US" dirty="0"/>
+              <a:t> </a:t>
+            </a:r>
+            <a:r>
+              <a:rPr lang="en-US" dirty="0" smtClean="0"/>
+              <a:t> Still a lot of manual steps</a:t>
+            </a:r>
+          </a:p>
+          <a:p>
+            <a:pPr lvl="1">
+              <a:buFont typeface="Arial" pitchFamily="34" charset="0"/>
+              <a:buChar char="•"/>
+            </a:pPr>
+            <a:r>
+              <a:rPr lang="en-US" dirty="0"/>
+              <a:t> </a:t>
+            </a:r>
+            <a:r>
+              <a:rPr lang="en-US" dirty="0" smtClean="0"/>
+              <a:t> Still Not Production Ready</a:t>
+            </a:r>
+          </a:p>
+          <a:p>
+            <a:pPr>
+              <a:buFont typeface="Arial" pitchFamily="34" charset="0"/>
+              <a:buChar char="•"/>
+            </a:pPr>
+            <a:r>
+              <a:rPr lang="en-US" dirty="0" smtClean="0"/>
+              <a:t>  Pros</a:t>
+            </a:r>
+          </a:p>
+          <a:p>
+            <a:pPr lvl="1">
+              <a:buFont typeface="Arial" pitchFamily="34" charset="0"/>
+              <a:buChar char="•"/>
+            </a:pPr>
+            <a:r>
+              <a:rPr lang="en-US" dirty="0"/>
+              <a:t> </a:t>
+            </a:r>
+            <a:r>
+              <a:rPr lang="en-US" dirty="0" smtClean="0"/>
+              <a:t> Provides a fully managed CI/CD Pipeline in a relatively short time</a:t>
+            </a:r>
+            <a:endParaRPr lang="en-US" dirty="0"/>
+          </a:p>
+          <a:p>
+            <a:pPr lvl="1">
+              <a:buFont typeface="Arial" pitchFamily="34" charset="0"/>
+              <a:buChar char="•"/>
+            </a:pPr>
+            <a:r>
+              <a:rPr lang="en-US" dirty="0" smtClean="0"/>
+              <a:t>  Saves a huge amount Initial Setup Time</a:t>
+            </a:r>
+          </a:p>
+          <a:p>
+            <a:pPr lvl="1">
+              <a:buFont typeface="Arial" pitchFamily="34" charset="0"/>
+              <a:buChar char="•"/>
+            </a:pPr>
+            <a:r>
+              <a:rPr lang="en-US" dirty="0"/>
+              <a:t> </a:t>
+            </a:r>
+            <a:r>
+              <a:rPr lang="en-US" dirty="0" smtClean="0"/>
+              <a:t> Gives an excellent Baseline from which to build from</a:t>
+            </a:r>
+          </a:p>
+        </p:txBody>
+      </p:sp>
+    </p:spTree>
+    <p:extLst>
+      <p:ext uri="{BB962C8B-B14F-4D97-AF65-F5344CB8AC3E}">
+        <p14:creationId xmlns:p14="http://schemas.microsoft.com/office/powerpoint/2010/main" val="1373314067"/>
+      </p:ext>
+    </p:extLst>
+  </p:cSld>
+  <p:clrMapOvr>
+    <a:masterClrMapping/>
+  </p:clrMapOvr>
+  <p:timing>
+    <p:tnLst>
+      <p:par>
+        <p:cTn id="1" dur="indefinite" restart="never" nodeType="tmRoot"/>
+      </p:par>
+    </p:tnLst>
+  </p:timing>
+</p:sld>
+</file>
+
+<file path=ppt/slides/slide11.xml><?xml version="1.0" encoding="utf-8"?>
+<p:sld xmlns:a="http://schemas.openxmlformats.org/drawingml/2006/main" xmlns:r="http://schemas.openxmlformats.org/officeDocument/2006/relationships" xmlns:p="http://schemas.openxmlformats.org/presentationml/2006/main">
+  <p:cSld>
+    <p:spTree>
+      <p:nvGrpSpPr>
+        <p:cNvPr id="1" name=""/>
+        <p:cNvGrpSpPr/>
+        <p:nvPr/>
+      </p:nvGrpSpPr>
+      <p:grpSpPr>
+        <a:xfrm>
+          <a:off x="0" y="0"/>
+          <a:ext cx="0" cy="0"/>
+          <a:chOff x="0" y="0"/>
+          <a:chExt cx="0" cy="0"/>
+        </a:xfrm>
+      </p:grpSpPr>
+      <p:sp>
+        <p:nvSpPr>
+          <p:cNvPr id="2" name="Title 1"/>
+          <p:cNvSpPr>
+            <a:spLocks noGrp="1"/>
+          </p:cNvSpPr>
+          <p:nvPr>
+            <p:ph type="title"/>
+          </p:nvPr>
+        </p:nvSpPr>
+        <p:spPr/>
+        <p:txBody>
+          <a:bodyPr/>
+          <a:lstStyle/>
+          <a:p>
+            <a:r>
+              <a:rPr lang="en-US" dirty="0" smtClean="0"/>
+              <a:t>Questions?</a:t>
+            </a:r>
+            <a:endParaRPr lang="en-US" dirty="0"/>
+          </a:p>
+        </p:txBody>
+      </p:sp>
+    </p:spTree>
+    <p:extLst>
+      <p:ext uri="{BB962C8B-B14F-4D97-AF65-F5344CB8AC3E}">
+        <p14:creationId xmlns:p14="http://schemas.microsoft.com/office/powerpoint/2010/main" val="1733325867"/>
+      </p:ext>
+    </p:extLst>
+  </p:cSld>
+  <p:clrMapOvr>
+    <a:masterClrMapping/>
+  </p:clrMapOvr>
+  <p:timing>
+    <p:tnLst>
+      <p:par>
+        <p:cTn id="1" dur="indefinite" restart="never" nodeType="tmRoot"/>
+      </p:par>
+    </p:tnLst>
+  </p:timing>
+</p:sld>
+</file>
+
+<file path=ppt/slides/slide12.xml><?xml version="1.0" encoding="utf-8"?>
+<p:sld xmlns:a="http://schemas.openxmlformats.org/drawingml/2006/main" xmlns:r="http://schemas.openxmlformats.org/officeDocument/2006/relationships" xmlns:p="http://schemas.openxmlformats.org/presentationml/2006/main">
+  <p:cSld>
+    <p:spTree>
+      <p:nvGrpSpPr>
+        <p:cNvPr id="1" name=""/>
+        <p:cNvGrpSpPr/>
+        <p:nvPr/>
+      </p:nvGrpSpPr>
+      <p:grpSpPr>
+        <a:xfrm>
+          <a:off x="0" y="0"/>
+          <a:ext cx="0" cy="0"/>
+          <a:chOff x="0" y="0"/>
+          <a:chExt cx="0" cy="0"/>
+        </a:xfrm>
+      </p:grpSpPr>
+      <p:sp>
+        <p:nvSpPr>
           <p:cNvPr id="5" name="TextBox 4"/>
           <p:cNvSpPr txBox="1"/>
           <p:nvPr/>
@@ -4175,7 +4419,7 @@
         <p:spPr>
           <a:xfrm>
             <a:off x="1082028" y="1683147"/>
-            <a:ext cx="6705600" cy="1200329"/>
+            <a:ext cx="6705600" cy="646331"/>
           </a:xfrm>
           <a:prstGeom prst="rect">
             <a:avLst/>
@@ -4208,22 +4452,8 @@
             </a:r>
             <a:r>
               <a:rPr lang="en-US" dirty="0" smtClean="0"/>
-              <a:t>  </a:t>
-            </a:r>
-          </a:p>
-          <a:p>
-            <a:pPr>
-              <a:buFont typeface="Arial" pitchFamily="34" charset="0"/>
-              <a:buChar char="•"/>
-            </a:pPr>
-            <a:endParaRPr lang="en-US" dirty="0"/>
-          </a:p>
-          <a:p>
-            <a:pPr>
-              <a:buFont typeface="Arial" pitchFamily="34" charset="0"/>
-              <a:buChar char="•"/>
-            </a:pPr>
-            <a:endParaRPr lang="en-US" dirty="0" smtClean="0"/>
+              <a:t> What’s Next?</a:t>
+            </a:r>
           </a:p>
         </p:txBody>
       </p:sp>
@@ -4298,7 +4528,7 @@
         <p:spPr>
           <a:xfrm>
             <a:off x="1082028" y="1456570"/>
-            <a:ext cx="7050468" cy="1477328"/>
+            <a:ext cx="7050468" cy="1200329"/>
           </a:xfrm>
           <a:prstGeom prst="rect">
             <a:avLst/>
@@ -4317,15 +4547,7 @@
             </a:pPr>
             <a:r>
               <a:rPr lang="en-US" dirty="0" smtClean="0"/>
-              <a:t>  AWS </a:t>
-            </a:r>
-            <a:r>
-              <a:rPr lang="en-US" dirty="0"/>
-              <a:t>Managed Services enables you to quickly and easily deploy your cloud </a:t>
-            </a:r>
-            <a:r>
-              <a:rPr lang="en-US" dirty="0" smtClean="0"/>
-              <a:t>infrastructure</a:t>
+              <a:t>  On Demand Build and Deploy</a:t>
             </a:r>
           </a:p>
           <a:p>
@@ -4333,7 +4555,14 @@
               <a:buFont typeface="Arial" pitchFamily="34" charset="0"/>
               <a:buChar char="•"/>
             </a:pPr>
-            <a:endParaRPr lang="en-US" dirty="0"/>
+            <a:r>
+              <a:rPr lang="en-US" dirty="0"/>
+              <a:t> </a:t>
+            </a:r>
+            <a:r>
+              <a:rPr lang="en-US" dirty="0" smtClean="0"/>
+              <a:t> Fast Feedback Loop</a:t>
+            </a:r>
           </a:p>
           <a:p>
             <a:pPr>
@@ -4341,13 +4570,27 @@
               <a:buChar char="•"/>
             </a:pPr>
             <a:r>
-              <a:rPr lang="en-US" dirty="0" smtClean="0"/>
-              <a:t>  On Demand</a:t>
-            </a:r>
-            <a:endParaRPr lang="en-US" dirty="0"/>
-          </a:p>
-          <a:p>
-            <a:endParaRPr lang="en-US" dirty="0" smtClean="0"/>
+              <a:rPr lang="en-US" dirty="0"/>
+              <a:t> </a:t>
+            </a:r>
+            <a:r>
+              <a:rPr lang="en-US" dirty="0" smtClean="0"/>
+              <a:t> Increased Transparency and Visibility</a:t>
+            </a:r>
+          </a:p>
+          <a:p>
+            <a:pPr>
+              <a:buFont typeface="Arial" pitchFamily="34" charset="0"/>
+              <a:buChar char="•"/>
+            </a:pPr>
+            <a:r>
+              <a:rPr lang="en-US" dirty="0"/>
+              <a:t> </a:t>
+            </a:r>
+            <a:r>
+              <a:rPr lang="en-US" dirty="0" smtClean="0"/>
+              <a:t> Modern Software Lifecycle Require It</a:t>
+            </a:r>
           </a:p>
         </p:txBody>
       </p:sp>
@@ -4430,29 +4673,26 @@
         </p:nvSpPr>
         <p:spPr/>
         <p:txBody>
-          <a:bodyPr>
-            <a:normAutofit/>
-          </a:bodyPr>
-          <a:lstStyle/>
-          <a:p>
-            <a:r>
-              <a:rPr lang="en-US" dirty="0" smtClean="0"/>
-              <a:t>Requirements</a:t>
-            </a:r>
-            <a:endParaRPr lang="en-US" dirty="0"/>
-          </a:p>
-        </p:txBody>
-      </p:sp>
-      <p:sp>
-        <p:nvSpPr>
-          <p:cNvPr id="4" name="TextBox 3"/>
+          <a:bodyPr/>
+          <a:lstStyle/>
+          <a:p>
+            <a:r>
+              <a:rPr lang="en-US" dirty="0"/>
+              <a:t>Why a CI/CD Pipeline?</a:t>
+            </a:r>
+          </a:p>
+        </p:txBody>
+      </p:sp>
+      <p:sp>
+        <p:nvSpPr>
+          <p:cNvPr id="3" name="TextBox 2"/>
           <p:cNvSpPr txBox="1"/>
           <p:nvPr/>
         </p:nvSpPr>
         <p:spPr>
           <a:xfrm>
-            <a:off x="1263242" y="1572798"/>
-            <a:ext cx="6705600" cy="923330"/>
+            <a:off x="1082028" y="1456570"/>
+            <a:ext cx="7050468" cy="2308324"/>
           </a:xfrm>
           <a:prstGeom prst="rect">
             <a:avLst/>
@@ -4470,8 +4710,62 @@
               <a:buChar char="•"/>
             </a:pPr>
             <a:r>
-              <a:rPr lang="en-US" dirty="0" smtClean="0"/>
-              <a:t>  AWS EKS Cluster</a:t>
+              <a:rPr lang="en-US" dirty="0"/>
+              <a:t> </a:t>
+            </a:r>
+            <a:r>
+              <a:rPr lang="en-US" dirty="0" smtClean="0"/>
+              <a:t> OK, We Want to Build a CI/CD Pipeline for our Kubernetes Cluster, what are our options?</a:t>
+            </a:r>
+          </a:p>
+          <a:p>
+            <a:pPr lvl="1">
+              <a:buFont typeface="Arial" pitchFamily="34" charset="0"/>
+              <a:buChar char="•"/>
+            </a:pPr>
+            <a:r>
+              <a:rPr lang="en-US" dirty="0"/>
+              <a:t> </a:t>
+            </a:r>
+            <a:r>
+              <a:rPr lang="en-US" dirty="0" smtClean="0"/>
+              <a:t> No AWS CodeStar Option?</a:t>
+            </a:r>
+          </a:p>
+          <a:p>
+            <a:pPr lvl="1">
+              <a:buFont typeface="Arial" pitchFamily="34" charset="0"/>
+              <a:buChar char="•"/>
+            </a:pPr>
+            <a:r>
+              <a:rPr lang="en-US" dirty="0"/>
+              <a:t> </a:t>
+            </a:r>
+            <a:r>
+              <a:rPr lang="en-US" dirty="0" smtClean="0"/>
+              <a:t> Build a </a:t>
+            </a:r>
+            <a:r>
+              <a:rPr lang="en-US" dirty="0" smtClean="0"/>
+              <a:t>Custom Jenkins </a:t>
+            </a:r>
+            <a:r>
+              <a:rPr lang="en-US" dirty="0" smtClean="0"/>
+              <a:t>Pipeline?</a:t>
+            </a:r>
+          </a:p>
+          <a:p>
+            <a:pPr lvl="1">
+              <a:buFont typeface="Arial" pitchFamily="34" charset="0"/>
+              <a:buChar char="•"/>
+            </a:pPr>
+            <a:r>
+              <a:rPr lang="en-US" dirty="0"/>
+              <a:t> </a:t>
+            </a:r>
+            <a:r>
+              <a:rPr lang="en-US" dirty="0" smtClean="0"/>
+              <a:t> Build an Pipeline External or Internal to Kubernetes?</a:t>
             </a:r>
           </a:p>
           <a:p>
@@ -4481,15 +4775,237 @@
             </a:pPr>
             <a:r>
               <a:rPr lang="en-US" dirty="0" smtClean="0"/>
-              <a:t>  </a:t>
-            </a:r>
-            <a:r>
-              <a:rPr lang="en-US" dirty="0" smtClean="0"/>
-              <a:t>EC2 </a:t>
-            </a:r>
-            <a:r>
-              <a:rPr lang="en-US" dirty="0" smtClean="0"/>
-              <a:t>Instance with kubectl installed and configured to talk to the cluster</a:t>
+              <a:t>  Geez, it shouldn’t be this tough</a:t>
+            </a:r>
+          </a:p>
+          <a:p>
+            <a:pPr>
+              <a:buFont typeface="Arial" pitchFamily="34" charset="0"/>
+              <a:buChar char="•"/>
+            </a:pPr>
+            <a:r>
+              <a:rPr lang="en-US" dirty="0"/>
+              <a:t> </a:t>
+            </a:r>
+            <a:r>
+              <a:rPr lang="en-US" dirty="0" smtClean="0"/>
+              <a:t> Just want to get something running quickly so we can get started</a:t>
+            </a:r>
+          </a:p>
+          <a:p>
+            <a:pPr>
+              <a:buFont typeface="Arial" pitchFamily="34" charset="0"/>
+              <a:buChar char="•"/>
+            </a:pPr>
+            <a:r>
+              <a:rPr lang="en-US" dirty="0"/>
+              <a:t> </a:t>
+            </a:r>
+            <a:r>
+              <a:rPr lang="en-US" dirty="0" smtClean="0"/>
+              <a:t> Do we really need to start from scratch?</a:t>
+            </a:r>
+          </a:p>
+        </p:txBody>
+      </p:sp>
+    </p:spTree>
+    <p:extLst>
+      <p:ext uri="{BB962C8B-B14F-4D97-AF65-F5344CB8AC3E}">
+        <p14:creationId xmlns:p14="http://schemas.microsoft.com/office/powerpoint/2010/main" val="3119431424"/>
+      </p:ext>
+    </p:extLst>
+  </p:cSld>
+  <p:clrMapOvr>
+    <a:masterClrMapping/>
+  </p:clrMapOvr>
+</p:sld>
+</file>
+
+<file path=ppt/slides/slide5.xml><?xml version="1.0" encoding="utf-8"?>
+<p:sld xmlns:a="http://schemas.openxmlformats.org/drawingml/2006/main" xmlns:r="http://schemas.openxmlformats.org/officeDocument/2006/relationships" xmlns:p="http://schemas.openxmlformats.org/presentationml/2006/main">
+  <p:cSld>
+    <p:spTree>
+      <p:nvGrpSpPr>
+        <p:cNvPr id="1" name=""/>
+        <p:cNvGrpSpPr/>
+        <p:nvPr/>
+      </p:nvGrpSpPr>
+      <p:grpSpPr>
+        <a:xfrm>
+          <a:off x="0" y="0"/>
+          <a:ext cx="0" cy="0"/>
+          <a:chOff x="0" y="0"/>
+          <a:chExt cx="0" cy="0"/>
+        </a:xfrm>
+      </p:grpSpPr>
+      <p:sp>
+        <p:nvSpPr>
+          <p:cNvPr id="2" name="Title 1"/>
+          <p:cNvSpPr>
+            <a:spLocks noGrp="1"/>
+          </p:cNvSpPr>
+          <p:nvPr>
+            <p:ph type="title"/>
+          </p:nvPr>
+        </p:nvSpPr>
+        <p:spPr/>
+        <p:txBody>
+          <a:bodyPr/>
+          <a:lstStyle/>
+          <a:p>
+            <a:r>
+              <a:rPr lang="en-US" dirty="0"/>
+              <a:t>Why a CI/CD Pipeline?</a:t>
+            </a:r>
+          </a:p>
+        </p:txBody>
+      </p:sp>
+      <p:sp>
+        <p:nvSpPr>
+          <p:cNvPr id="3" name="TextBox 2"/>
+          <p:cNvSpPr txBox="1"/>
+          <p:nvPr/>
+        </p:nvSpPr>
+        <p:spPr>
+          <a:xfrm>
+            <a:off x="510439" y="1782918"/>
+            <a:ext cx="8245634" cy="369332"/>
+          </a:xfrm>
+          <a:prstGeom prst="rect">
+            <a:avLst/>
+          </a:prstGeom>
+          <a:noFill/>
+        </p:spPr>
+        <p:txBody>
+          <a:bodyPr wrap="square" rtlCol="0">
+            <a:spAutoFit/>
+          </a:bodyPr>
+          <a:lstStyle/>
+          <a:p>
+            <a:pPr marL="285750" indent="-285750">
+              <a:buFont typeface="Arial" pitchFamily="34" charset="0"/>
+              <a:buChar char="•"/>
+            </a:pPr>
+            <a:r>
+              <a:rPr lang="en-US" dirty="0" smtClean="0"/>
+              <a:t>AWS CodeSuite </a:t>
+            </a:r>
+            <a:r>
+              <a:rPr lang="en-US" dirty="0"/>
+              <a:t>- Continuous Deployment Reference Architecture for </a:t>
+            </a:r>
+            <a:r>
+              <a:rPr lang="en-US" dirty="0" smtClean="0"/>
+              <a:t>Kubernetes</a:t>
+            </a:r>
+            <a:endParaRPr lang="en-US" dirty="0"/>
+          </a:p>
+        </p:txBody>
+      </p:sp>
+    </p:spTree>
+    <p:extLst>
+      <p:ext uri="{BB962C8B-B14F-4D97-AF65-F5344CB8AC3E}">
+        <p14:creationId xmlns:p14="http://schemas.microsoft.com/office/powerpoint/2010/main" val="2003171509"/>
+      </p:ext>
+    </p:extLst>
+  </p:cSld>
+  <p:clrMapOvr>
+    <a:masterClrMapping/>
+  </p:clrMapOvr>
+</p:sld>
+</file>
+
+<file path=ppt/slides/slide6.xml><?xml version="1.0" encoding="utf-8"?>
+<p:sld xmlns:a="http://schemas.openxmlformats.org/drawingml/2006/main" xmlns:r="http://schemas.openxmlformats.org/officeDocument/2006/relationships" xmlns:p="http://schemas.openxmlformats.org/presentationml/2006/main">
+  <p:cSld>
+    <p:spTree>
+      <p:nvGrpSpPr>
+        <p:cNvPr id="1" name=""/>
+        <p:cNvGrpSpPr/>
+        <p:nvPr/>
+      </p:nvGrpSpPr>
+      <p:grpSpPr>
+        <a:xfrm>
+          <a:off x="0" y="0"/>
+          <a:ext cx="0" cy="0"/>
+          <a:chOff x="0" y="0"/>
+          <a:chExt cx="0" cy="0"/>
+        </a:xfrm>
+      </p:grpSpPr>
+      <p:sp>
+        <p:nvSpPr>
+          <p:cNvPr id="2" name="Title 1"/>
+          <p:cNvSpPr>
+            <a:spLocks noGrp="1"/>
+          </p:cNvSpPr>
+          <p:nvPr>
+            <p:ph type="title"/>
+          </p:nvPr>
+        </p:nvSpPr>
+        <p:spPr/>
+        <p:txBody>
+          <a:bodyPr>
+            <a:normAutofit/>
+          </a:bodyPr>
+          <a:lstStyle/>
+          <a:p>
+            <a:r>
+              <a:rPr lang="en-US" dirty="0" smtClean="0"/>
+              <a:t>Requirements</a:t>
+            </a:r>
+            <a:endParaRPr lang="en-US" dirty="0"/>
+          </a:p>
+        </p:txBody>
+      </p:sp>
+      <p:sp>
+        <p:nvSpPr>
+          <p:cNvPr id="4" name="TextBox 3"/>
+          <p:cNvSpPr txBox="1"/>
+          <p:nvPr/>
+        </p:nvSpPr>
+        <p:spPr>
+          <a:xfrm>
+            <a:off x="1263242" y="1572798"/>
+            <a:ext cx="6705600" cy="1200329"/>
+          </a:xfrm>
+          <a:prstGeom prst="rect">
+            <a:avLst/>
+          </a:prstGeom>
+          <a:noFill/>
+        </p:spPr>
+        <p:txBody>
+          <a:bodyPr wrap="square" rtlCol="0">
+            <a:spAutoFit/>
+          </a:bodyPr>
+          <a:lstStyle/>
+          <a:p>
+            <a:pPr>
+              <a:buFont typeface="Arial" pitchFamily="34" charset="0"/>
+              <a:buChar char="•"/>
+            </a:pPr>
+            <a:r>
+              <a:rPr lang="en-US" dirty="0" smtClean="0"/>
+              <a:t>  AWS Account (Root)</a:t>
+            </a:r>
+          </a:p>
+          <a:p>
+            <a:pPr>
+              <a:buFont typeface="Arial" pitchFamily="34" charset="0"/>
+              <a:buChar char="•"/>
+            </a:pPr>
+            <a:r>
+              <a:rPr lang="en-US" dirty="0" smtClean="0"/>
+              <a:t>  AWS EKS Cluster Configured</a:t>
+            </a:r>
+          </a:p>
+          <a:p>
+            <a:pPr>
+              <a:buFont typeface="Arial" pitchFamily="34" charset="0"/>
+              <a:buChar char="•"/>
+            </a:pPr>
+            <a:r>
+              <a:rPr lang="en-US" dirty="0" smtClean="0"/>
+              <a:t>  EC2 Instance with “kubectl” installed and configured to talk to the cluster</a:t>
             </a:r>
           </a:p>
         </p:txBody>
@@ -4509,7 +5025,7 @@
 </p:sld>
 </file>
 
-<file path=ppt/slides/slide5.xml><?xml version="1.0" encoding="utf-8"?>
+<file path=ppt/slides/slide7.xml><?xml version="1.0" encoding="utf-8"?>
 <p:sld xmlns:a="http://schemas.openxmlformats.org/drawingml/2006/main" xmlns:r="http://schemas.openxmlformats.org/officeDocument/2006/relationships" xmlns:p="http://schemas.openxmlformats.org/presentationml/2006/main">
   <p:cSld>
     <p:spTree>
@@ -4579,7 +5095,7 @@
         </p:blipFill>
         <p:spPr bwMode="auto">
           <a:xfrm>
-            <a:off x="551117" y="1374632"/>
+            <a:off x="231955" y="1374632"/>
             <a:ext cx="7881820" cy="5120640"/>
           </a:xfrm>
           <a:prstGeom prst="rect">
@@ -4640,366 +5156,6 @@
 </p:sld>
 </file>
 
-<file path=ppt/slides/slide6.xml><?xml version="1.0" encoding="utf-8"?>
-<p:sld xmlns:a="http://schemas.openxmlformats.org/drawingml/2006/main" xmlns:r="http://schemas.openxmlformats.org/officeDocument/2006/relationships" xmlns:p="http://schemas.openxmlformats.org/presentationml/2006/main">
-  <p:cSld>
-    <p:spTree>
-      <p:nvGrpSpPr>
-        <p:cNvPr id="1" name=""/>
-        <p:cNvGrpSpPr/>
-        <p:nvPr/>
-      </p:nvGrpSpPr>
-      <p:grpSpPr>
-        <a:xfrm>
-          <a:off x="0" y="0"/>
-          <a:ext cx="0" cy="0"/>
-          <a:chOff x="0" y="0"/>
-          <a:chExt cx="0" cy="0"/>
-        </a:xfrm>
-      </p:grpSpPr>
-      <p:sp>
-        <p:nvSpPr>
-          <p:cNvPr id="3" name="Title 1"/>
-          <p:cNvSpPr>
-            <a:spLocks noGrp="1"/>
-          </p:cNvSpPr>
-          <p:nvPr>
-            <p:ph type="title"/>
-          </p:nvPr>
-        </p:nvSpPr>
-        <p:spPr/>
-        <p:txBody>
-          <a:bodyPr/>
-          <a:lstStyle/>
-          <a:p>
-            <a:r>
-              <a:rPr lang="en-US" dirty="0" smtClean="0"/>
-              <a:t>Installation Steps</a:t>
-            </a:r>
-            <a:endParaRPr lang="en-US" dirty="0"/>
-          </a:p>
-        </p:txBody>
-      </p:sp>
-      <p:sp>
-        <p:nvSpPr>
-          <p:cNvPr id="5" name="TextBox 4"/>
-          <p:cNvSpPr txBox="1"/>
-          <p:nvPr/>
-        </p:nvSpPr>
-        <p:spPr>
-          <a:xfrm>
-            <a:off x="806003" y="1750441"/>
-            <a:ext cx="7608651" cy="2031325"/>
-          </a:xfrm>
-          <a:prstGeom prst="rect">
-            <a:avLst/>
-          </a:prstGeom>
-          <a:noFill/>
-        </p:spPr>
-        <p:txBody>
-          <a:bodyPr wrap="square" rtlCol="0">
-            <a:spAutoFit/>
-          </a:bodyPr>
-          <a:lstStyle/>
-          <a:p>
-            <a:pPr marL="285750" indent="-285750">
-              <a:buFont typeface="Arial" pitchFamily="34" charset="0"/>
-              <a:buChar char="•"/>
-            </a:pPr>
-            <a:r>
-              <a:rPr lang="en-US" dirty="0" smtClean="0"/>
-              <a:t>Checkout </a:t>
-            </a:r>
-            <a:r>
-              <a:rPr lang="en-US" dirty="0"/>
-              <a:t>aws-kube-codesuite from the aws-samples </a:t>
-            </a:r>
-            <a:r>
-              <a:rPr lang="en-US" dirty="0" smtClean="0"/>
-              <a:t>github</a:t>
-            </a:r>
-          </a:p>
-          <a:p>
-            <a:pPr marL="285750" indent="-285750">
-              <a:buFont typeface="Arial" pitchFamily="34" charset="0"/>
-              <a:buChar char="•"/>
-            </a:pPr>
-            <a:r>
-              <a:rPr lang="en-US" dirty="0" smtClean="0"/>
-              <a:t>Deploy </a:t>
-            </a:r>
-            <a:r>
-              <a:rPr lang="en-US" dirty="0"/>
-              <a:t>the Initial </a:t>
-            </a:r>
-            <a:r>
-              <a:rPr lang="en-US" dirty="0" smtClean="0"/>
-              <a:t>Application</a:t>
-            </a:r>
-          </a:p>
-          <a:p>
-            <a:pPr marL="285750" indent="-285750">
-              <a:buFont typeface="Arial" pitchFamily="34" charset="0"/>
-              <a:buChar char="•"/>
-            </a:pPr>
-            <a:r>
-              <a:rPr lang="en-US" dirty="0" smtClean="0"/>
-              <a:t>Create </a:t>
-            </a:r>
-            <a:r>
-              <a:rPr lang="en-US" dirty="0"/>
-              <a:t>S3 Deployment </a:t>
-            </a:r>
-            <a:r>
-              <a:rPr lang="en-US" dirty="0" smtClean="0"/>
-              <a:t>Bucket</a:t>
-            </a:r>
-          </a:p>
-          <a:p>
-            <a:pPr marL="285750" indent="-285750">
-              <a:buFont typeface="Arial" pitchFamily="34" charset="0"/>
-              <a:buChar char="•"/>
-            </a:pPr>
-            <a:r>
-              <a:rPr lang="en-US" dirty="0" smtClean="0"/>
-              <a:t>Use </a:t>
-            </a:r>
-            <a:r>
-              <a:rPr lang="en-US" dirty="0"/>
-              <a:t>AWS CloudFormation to Create the CI/CD </a:t>
-            </a:r>
-            <a:r>
-              <a:rPr lang="en-US" dirty="0" smtClean="0"/>
-              <a:t>Pipeline</a:t>
-            </a:r>
-          </a:p>
-          <a:p>
-            <a:pPr marL="285750" indent="-285750">
-              <a:buFont typeface="Arial" pitchFamily="34" charset="0"/>
-              <a:buChar char="•"/>
-            </a:pPr>
-            <a:r>
-              <a:rPr lang="en-US" dirty="0" smtClean="0"/>
-              <a:t>Give </a:t>
-            </a:r>
-            <a:r>
-              <a:rPr lang="en-US" dirty="0"/>
-              <a:t>Lambda Execution Role Permissions in Amazon EKS </a:t>
-            </a:r>
-            <a:r>
-              <a:rPr lang="en-US" dirty="0" smtClean="0"/>
-              <a:t>Cluster</a:t>
-            </a:r>
-          </a:p>
-          <a:p>
-            <a:pPr marL="285750" indent="-285750">
-              <a:buFont typeface="Arial" pitchFamily="34" charset="0"/>
-              <a:buChar char="•"/>
-            </a:pPr>
-            <a:r>
-              <a:rPr lang="en-US" dirty="0" smtClean="0"/>
-              <a:t>Test </a:t>
-            </a:r>
-            <a:r>
-              <a:rPr lang="en-US" dirty="0"/>
-              <a:t>CI/CD </a:t>
-            </a:r>
-            <a:r>
-              <a:rPr lang="en-US" dirty="0" smtClean="0"/>
-              <a:t>Pipeline</a:t>
-            </a:r>
-          </a:p>
-          <a:p>
-            <a:pPr marL="285750" indent="-285750">
-              <a:buFont typeface="Arial" pitchFamily="34" charset="0"/>
-              <a:buChar char="•"/>
-            </a:pPr>
-            <a:r>
-              <a:rPr lang="en-US" dirty="0" smtClean="0"/>
-              <a:t>Remove </a:t>
-            </a:r>
-            <a:r>
-              <a:rPr lang="en-US" dirty="0"/>
-              <a:t>CI/CD Pipeline</a:t>
-            </a:r>
-            <a:endParaRPr lang="en-US" dirty="0" smtClean="0"/>
-          </a:p>
-        </p:txBody>
-      </p:sp>
-    </p:spTree>
-  </p:cSld>
-  <p:clrMapOvr>
-    <a:masterClrMapping/>
-  </p:clrMapOvr>
-  <p:timing>
-    <p:tnLst>
-      <p:par>
-        <p:cTn id="1" dur="indefinite" restart="never" nodeType="tmRoot"/>
-      </p:par>
-    </p:tnLst>
-  </p:timing>
-</p:sld>
-</file>
-
-<file path=ppt/slides/slide7.xml><?xml version="1.0" encoding="utf-8"?>
-<p:sld xmlns:a="http://schemas.openxmlformats.org/drawingml/2006/main" xmlns:r="http://schemas.openxmlformats.org/officeDocument/2006/relationships" xmlns:p="http://schemas.openxmlformats.org/presentationml/2006/main">
-  <p:cSld>
-    <p:spTree>
-      <p:nvGrpSpPr>
-        <p:cNvPr id="1" name=""/>
-        <p:cNvGrpSpPr/>
-        <p:nvPr/>
-      </p:nvGrpSpPr>
-      <p:grpSpPr>
-        <a:xfrm>
-          <a:off x="0" y="0"/>
-          <a:ext cx="0" cy="0"/>
-          <a:chOff x="0" y="0"/>
-          <a:chExt cx="0" cy="0"/>
-        </a:xfrm>
-      </p:grpSpPr>
-      <p:sp>
-        <p:nvSpPr>
-          <p:cNvPr id="3" name="Title 1"/>
-          <p:cNvSpPr>
-            <a:spLocks noGrp="1"/>
-          </p:cNvSpPr>
-          <p:nvPr>
-            <p:ph type="title"/>
-          </p:nvPr>
-        </p:nvSpPr>
-        <p:spPr/>
-        <p:txBody>
-          <a:bodyPr/>
-          <a:lstStyle/>
-          <a:p>
-            <a:r>
-              <a:rPr lang="en-US" dirty="0" smtClean="0"/>
-              <a:t>Quick Demo</a:t>
-            </a:r>
-            <a:endParaRPr lang="en-US" dirty="0"/>
-          </a:p>
-        </p:txBody>
-      </p:sp>
-      <p:sp>
-        <p:nvSpPr>
-          <p:cNvPr id="5" name="TextBox 4"/>
-          <p:cNvSpPr txBox="1"/>
-          <p:nvPr/>
-        </p:nvSpPr>
-        <p:spPr>
-          <a:xfrm>
-            <a:off x="757367" y="1584186"/>
-            <a:ext cx="7515090" cy="2862322"/>
-          </a:xfrm>
-          <a:prstGeom prst="rect">
-            <a:avLst/>
-          </a:prstGeom>
-          <a:noFill/>
-        </p:spPr>
-        <p:txBody>
-          <a:bodyPr wrap="square" rtlCol="0">
-            <a:spAutoFit/>
-          </a:bodyPr>
-          <a:lstStyle/>
-          <a:p>
-            <a:pPr>
-              <a:buFont typeface="Arial" pitchFamily="34" charset="0"/>
-              <a:buChar char="•"/>
-            </a:pPr>
-            <a:r>
-              <a:rPr lang="en-US" dirty="0" smtClean="0"/>
-              <a:t>  To save time the AWS EKS Cluster, CI/CD Pipeline, and the sample-app have already been deployed.   We’ll:</a:t>
-            </a:r>
-          </a:p>
-          <a:p>
-            <a:endParaRPr lang="en-US" dirty="0" smtClean="0"/>
-          </a:p>
-          <a:p>
-            <a:pPr lvl="1">
-              <a:buFont typeface="Arial" pitchFamily="34" charset="0"/>
-              <a:buChar char="•"/>
-            </a:pPr>
-            <a:r>
-              <a:rPr lang="en-US" dirty="0"/>
-              <a:t> </a:t>
-            </a:r>
-            <a:r>
-              <a:rPr lang="en-US" dirty="0" smtClean="0"/>
-              <a:t> Modify the sample-app “Hello, World!”</a:t>
-            </a:r>
-          </a:p>
-          <a:p>
-            <a:pPr lvl="1">
-              <a:buFont typeface="Arial" pitchFamily="34" charset="0"/>
-              <a:buChar char="•"/>
-            </a:pPr>
-            <a:r>
-              <a:rPr lang="en-US" dirty="0"/>
-              <a:t> </a:t>
-            </a:r>
-            <a:r>
-              <a:rPr lang="en-US" dirty="0" smtClean="0"/>
-              <a:t> Push the modifications to the aws CodeCommit Repo using Git</a:t>
-            </a:r>
-          </a:p>
-          <a:p>
-            <a:pPr lvl="1">
-              <a:buFont typeface="Arial" pitchFamily="34" charset="0"/>
-              <a:buChar char="•"/>
-            </a:pPr>
-            <a:r>
-              <a:rPr lang="en-US" dirty="0"/>
-              <a:t> </a:t>
-            </a:r>
-            <a:r>
-              <a:rPr lang="en-US" dirty="0" smtClean="0"/>
-              <a:t> Watch the pipeline automatically pickup the code change, build the container, and push the new container into Kubernetes.</a:t>
-            </a:r>
-          </a:p>
-          <a:p>
-            <a:pPr lvl="1"/>
-            <a:r>
-              <a:rPr lang="en-US" dirty="0" smtClean="0"/>
-              <a:t> </a:t>
-            </a:r>
-          </a:p>
-          <a:p>
-            <a:pPr>
-              <a:buFont typeface="Arial" pitchFamily="34" charset="0"/>
-              <a:buChar char="•"/>
-            </a:pPr>
-            <a:r>
-              <a:rPr lang="en-US" dirty="0"/>
-              <a:t> </a:t>
-            </a:r>
-            <a:r>
-              <a:rPr lang="en-US" dirty="0" smtClean="0"/>
-              <a:t> You should see the message we changed in the code artifact appear when we access the load balancer endpoint</a:t>
-            </a:r>
-          </a:p>
-        </p:txBody>
-      </p:sp>
-    </p:spTree>
-    <p:extLst>
-      <p:ext uri="{BB962C8B-B14F-4D97-AF65-F5344CB8AC3E}">
-        <p14:creationId xmlns:p14="http://schemas.microsoft.com/office/powerpoint/2010/main" val="2159253671"/>
-      </p:ext>
-    </p:extLst>
-  </p:cSld>
-  <p:clrMapOvr>
-    <a:masterClrMapping/>
-  </p:clrMapOvr>
-  <p:timing>
-    <p:tnLst>
-      <p:par>
-        <p:cTn id="1" dur="indefinite" restart="never" nodeType="tmRoot"/>
-      </p:par>
-    </p:tnLst>
-  </p:timing>
-</p:sld>
-</file>
-
 <file path=ppt/slides/slide8.xml><?xml version="1.0" encoding="utf-8"?>
 <p:sld xmlns:a="http://schemas.openxmlformats.org/drawingml/2006/main" xmlns:r="http://schemas.openxmlformats.org/officeDocument/2006/relationships" xmlns:p="http://schemas.openxmlformats.org/presentationml/2006/main">
   <p:cSld>
@@ -5034,7 +5190,7 @@
           <a:p>
             <a:r>
               <a:rPr lang="en-US" dirty="0" smtClean="0"/>
-              <a:t>Conclusions</a:t>
+              <a:t>Installation Steps</a:t>
             </a:r>
             <a:endParaRPr lang="en-US" dirty="0"/>
           </a:p>
@@ -5048,8 +5204,8 @@
         </p:nvSpPr>
         <p:spPr>
           <a:xfrm>
-            <a:off x="757367" y="1584186"/>
-            <a:ext cx="7515090" cy="1754326"/>
+            <a:off x="510439" y="1782918"/>
+            <a:ext cx="8245634" cy="2308324"/>
           </a:xfrm>
           <a:prstGeom prst="rect">
             <a:avLst/>
@@ -5062,75 +5218,145 @@
           </a:bodyPr>
           <a:lstStyle/>
           <a:p>
-            <a:pPr>
+            <a:pPr marL="285750" indent="-285750">
               <a:buFont typeface="Arial" pitchFamily="34" charset="0"/>
               <a:buChar char="•"/>
             </a:pPr>
             <a:r>
               <a:rPr lang="en-US" dirty="0" smtClean="0"/>
-              <a:t>  Cons</a:t>
-            </a:r>
-          </a:p>
-          <a:p>
-            <a:pPr lvl="1">
+              <a:t>Checkout </a:t>
+            </a:r>
+            <a:r>
+              <a:rPr lang="en-US" dirty="0"/>
+              <a:t>aws-eks-pipeline-quickstart from </a:t>
+            </a:r>
+            <a:r>
+              <a:rPr lang="en-US" dirty="0" smtClean="0"/>
+              <a:t>github</a:t>
+            </a:r>
+          </a:p>
+          <a:p>
+            <a:pPr marL="285750" indent="-285750">
               <a:buFont typeface="Arial" pitchFamily="34" charset="0"/>
               <a:buChar char="•"/>
             </a:pPr>
             <a:r>
+              <a:rPr lang="en-US" dirty="0" smtClean="0"/>
+              <a:t>Deploy </a:t>
+            </a:r>
+            <a:r>
               <a:rPr lang="en-US" dirty="0"/>
-              <a:t> </a:t>
-            </a:r>
-            <a:r>
-              <a:rPr lang="en-US" dirty="0" smtClean="0"/>
-              <a:t> The pipeline does not currently support Development Teams</a:t>
-            </a:r>
-          </a:p>
-          <a:p>
-            <a:pPr lvl="1">
+              <a:t>the Initial </a:t>
+            </a:r>
+            <a:r>
+              <a:rPr lang="en-US" dirty="0" smtClean="0"/>
+              <a:t>Application</a:t>
+            </a:r>
+          </a:p>
+          <a:p>
+            <a:pPr marL="285750" indent="-285750">
               <a:buFont typeface="Arial" pitchFamily="34" charset="0"/>
               <a:buChar char="•"/>
             </a:pPr>
             <a:r>
               <a:rPr lang="en-US" dirty="0"/>
-              <a:t> </a:t>
-            </a:r>
-            <a:r>
-              <a:rPr lang="en-US" dirty="0" smtClean="0"/>
-              <a:t> The pipeline does not currently support a more Complex Delivery Process</a:t>
-            </a:r>
-          </a:p>
-          <a:p>
-            <a:pPr>
+              <a:t>Create S3 </a:t>
+            </a:r>
+            <a:r>
+              <a:rPr lang="en-US" dirty="0" smtClean="0"/>
+              <a:t>Bucket </a:t>
+            </a:r>
+            <a:r>
+              <a:rPr lang="en-US" dirty="0" smtClean="0"/>
+              <a:t>and Upload Deployment Artifacts</a:t>
+            </a:r>
+          </a:p>
+          <a:p>
+            <a:pPr marL="285750" indent="-285750">
               <a:buFont typeface="Arial" pitchFamily="34" charset="0"/>
               <a:buChar char="•"/>
             </a:pPr>
             <a:r>
               <a:rPr lang="en-US" dirty="0" smtClean="0"/>
-              <a:t>  Pros</a:t>
-            </a:r>
-          </a:p>
-          <a:p>
-            <a:pPr lvl="1">
+              <a:t>Use AWS CloudFormation </a:t>
+            </a:r>
+            <a:r>
+              <a:rPr lang="en-US" dirty="0"/>
+              <a:t>to Create the CI/CD </a:t>
+            </a:r>
+            <a:r>
+              <a:rPr lang="en-US" dirty="0" smtClean="0"/>
+              <a:t>Pipeline</a:t>
+            </a:r>
+          </a:p>
+          <a:p>
+            <a:pPr marL="285750" indent="-285750">
               <a:buFont typeface="Arial" pitchFamily="34" charset="0"/>
               <a:buChar char="•"/>
             </a:pPr>
             <a:r>
               <a:rPr lang="en-US" dirty="0"/>
-              <a:t> </a:t>
-            </a:r>
-            <a:r>
-              <a:rPr lang="en-US" dirty="0" smtClean="0"/>
-              <a:t> Provides a fully managed CI/CD Pipeline in a relatively short time.</a:t>
-            </a:r>
+              <a:t>Give Lambda Execution Role Permissions in </a:t>
+            </a:r>
+            <a:r>
+              <a:rPr lang="en-US" dirty="0" smtClean="0"/>
+              <a:t>AWS EKS Cluster</a:t>
+            </a:r>
+          </a:p>
+          <a:p>
+            <a:pPr marL="285750" indent="-285750">
+              <a:buFont typeface="Arial" pitchFamily="34" charset="0"/>
+              <a:buChar char="•"/>
+            </a:pPr>
+            <a:r>
+              <a:rPr lang="en-US" dirty="0" smtClean="0"/>
+              <a:t>Add </a:t>
+            </a:r>
+            <a:r>
+              <a:rPr lang="en-US" dirty="0"/>
+              <a:t>git Credential </a:t>
+            </a:r>
+            <a:r>
+              <a:rPr lang="en-US" dirty="0" smtClean="0"/>
+              <a:t>Helper to Development Environment</a:t>
+            </a:r>
+          </a:p>
+          <a:p>
+            <a:pPr marL="285750" indent="-285750">
+              <a:buFont typeface="Arial" pitchFamily="34" charset="0"/>
+              <a:buChar char="•"/>
+            </a:pPr>
+            <a:r>
+              <a:rPr lang="en-US" dirty="0" smtClean="0"/>
+              <a:t>Test </a:t>
+            </a:r>
+            <a:r>
+              <a:rPr lang="en-US" dirty="0"/>
+              <a:t>CI/CD </a:t>
+            </a:r>
+            <a:r>
+              <a:rPr lang="en-US" dirty="0" smtClean="0"/>
+              <a:t>Pipeline</a:t>
+            </a:r>
+          </a:p>
+          <a:p>
+            <a:pPr marL="285750" indent="-285750">
+              <a:buFont typeface="Arial" pitchFamily="34" charset="0"/>
+              <a:buChar char="•"/>
+            </a:pPr>
+            <a:r>
+              <a:rPr lang="en-US" dirty="0" smtClean="0"/>
+              <a:t>Remove </a:t>
+            </a:r>
+            <a:r>
+              <a:rPr lang="en-US" dirty="0"/>
+              <a:t>CI/CD Pipeline</a:t>
+            </a:r>
+            <a:endParaRPr lang="en-US" dirty="0" smtClean="0"/>
           </a:p>
         </p:txBody>
       </p:sp>
     </p:spTree>
-    <p:extLst>
-      <p:ext uri="{BB962C8B-B14F-4D97-AF65-F5344CB8AC3E}">
-        <p14:creationId xmlns:p14="http://schemas.microsoft.com/office/powerpoint/2010/main" val="1373314067"/>
-      </p:ext>
-    </p:extLst>
   </p:cSld>
   <p:clrMapOvr>
     <a:masterClrMapping/>
@@ -5164,7 +5390,7 @@
       </p:grpSpPr>
       <p:sp>
         <p:nvSpPr>
-          <p:cNvPr id="2" name="Title 1"/>
+          <p:cNvPr id="3" name="Title 1"/>
           <p:cNvSpPr>
             <a:spLocks noGrp="1"/>
           </p:cNvSpPr>
@@ -5179,16 +5405,137 @@
           <a:p>
             <a:r>
               <a:rPr lang="en-US" dirty="0" smtClean="0"/>
-              <a:t>Questions?</a:t>
+              <a:t>Quick Demo</a:t>
             </a:r>
             <a:endParaRPr lang="en-US" dirty="0"/>
+          </a:p>
+        </p:txBody>
+      </p:sp>
+      <p:sp>
+        <p:nvSpPr>
+          <p:cNvPr id="5" name="TextBox 4"/>
+          <p:cNvSpPr txBox="1"/>
+          <p:nvPr/>
+        </p:nvSpPr>
+        <p:spPr>
+          <a:xfrm>
+            <a:off x="757367" y="1584186"/>
+            <a:ext cx="7515090" cy="2585323"/>
+          </a:xfrm>
+          <a:prstGeom prst="rect">
+            <a:avLst/>
+          </a:prstGeom>
+          <a:noFill/>
+        </p:spPr>
+        <p:txBody>
+          <a:bodyPr wrap="square" rtlCol="0">
+            <a:spAutoFit/>
+          </a:bodyPr>
+          <a:lstStyle/>
+          <a:p>
+            <a:pPr>
+              <a:buFont typeface="Arial" pitchFamily="34" charset="0"/>
+              <a:buChar char="•"/>
+            </a:pPr>
+            <a:r>
+              <a:rPr lang="en-US" dirty="0" smtClean="0"/>
+              <a:t>  To save time the AWS EKS Cluster, the </a:t>
+            </a:r>
+            <a:r>
+              <a:rPr lang="en-US" dirty="0" smtClean="0"/>
+              <a:t>AWS CodePipeline</a:t>
+            </a:r>
+            <a:r>
+              <a:rPr lang="en-US" dirty="0" smtClean="0"/>
+              <a:t>, and the sample-app have already been deployed.   We’ll:</a:t>
+            </a:r>
+          </a:p>
+          <a:p>
+            <a:pPr>
+              <a:buFont typeface="Arial" pitchFamily="34" charset="0"/>
+              <a:buChar char="•"/>
+            </a:pPr>
+            <a:endParaRPr lang="en-US" dirty="0" smtClean="0"/>
+          </a:p>
+          <a:p>
+            <a:pPr lvl="1">
+              <a:buFont typeface="Arial" pitchFamily="34" charset="0"/>
+              <a:buChar char="•"/>
+            </a:pPr>
+            <a:r>
+              <a:rPr lang="en-US" dirty="0"/>
+              <a:t> </a:t>
+            </a:r>
+            <a:r>
+              <a:rPr lang="en-US" dirty="0" smtClean="0"/>
+              <a:t> Push </a:t>
+            </a:r>
+            <a:r>
+              <a:rPr lang="en-US" dirty="0" smtClean="0"/>
+              <a:t>a </a:t>
+            </a:r>
+            <a:r>
+              <a:rPr lang="en-US" dirty="0" smtClean="0"/>
+              <a:t>simple modification to the aws CodeCommit Repo using git</a:t>
+            </a:r>
+          </a:p>
+          <a:p>
+            <a:pPr lvl="1">
+              <a:buFont typeface="Arial" pitchFamily="34" charset="0"/>
+              <a:buChar char="•"/>
+            </a:pPr>
+            <a:r>
+              <a:rPr lang="en-US" dirty="0"/>
+              <a:t> </a:t>
+            </a:r>
+            <a:r>
+              <a:rPr lang="en-US" dirty="0" smtClean="0"/>
+              <a:t> Watch the pipeline automatically pickup the code change, build the container, and push the new container into Kubernetes.</a:t>
+            </a:r>
+          </a:p>
+          <a:p>
+            <a:pPr lvl="1"/>
+            <a:r>
+              <a:rPr lang="en-US" dirty="0" smtClean="0"/>
+              <a:t> </a:t>
+            </a:r>
+          </a:p>
+          <a:p>
+            <a:pPr>
+              <a:buFont typeface="Arial" pitchFamily="34" charset="0"/>
+              <a:buChar char="•"/>
+            </a:pPr>
+            <a:r>
+              <a:rPr lang="en-US" dirty="0"/>
+              <a:t> </a:t>
+            </a:r>
+            <a:r>
+              <a:rPr lang="en-US" dirty="0" smtClean="0"/>
+              <a:t> </a:t>
+            </a:r>
+            <a:r>
+              <a:rPr lang="en-US" dirty="0" smtClean="0"/>
+              <a:t>We should </a:t>
+            </a:r>
+            <a:r>
+              <a:rPr lang="en-US" dirty="0" smtClean="0"/>
+              <a:t>see the message </a:t>
+            </a:r>
+            <a:r>
+              <a:rPr lang="en-US" dirty="0" smtClean="0"/>
+              <a:t>“Hello World” appear </a:t>
+            </a:r>
+            <a:r>
+              <a:rPr lang="en-US" dirty="0" smtClean="0"/>
+              <a:t>when we access the load balancer endpoint</a:t>
+            </a:r>
           </a:p>
         </p:txBody>
       </p:sp>
     </p:spTree>
     <p:extLst>
       <p:ext uri="{BB962C8B-B14F-4D97-AF65-F5344CB8AC3E}">
-        <p14:creationId xmlns:p14="http://schemas.microsoft.com/office/powerpoint/2010/main" val="1733325867"/>
+        <p14:creationId xmlns:p14="http://schemas.microsoft.com/office/powerpoint/2010/main" val="2159253671"/>
       </p:ext>
     </p:extLst>
   </p:cSld>

</xml_diff>

<commit_message>
Added AWS Public Summit tailored slides
</commit_message>
<xml_diff>
--- a/slides/AWS-EKS-Pipeline-QuickStart.pptx
+++ b/slides/AWS-EKS-Pipeline-QuickStart.pptx
@@ -207,7 +207,7 @@
             <a:fld id="{814910AB-AEF0-414C-82CB-791080B1186B}" type="datetimeFigureOut">
               <a:rPr lang="en-US" smtClean="0"/>
               <a:pPr/>
-              <a:t>2/6/2019</a:t>
+              <a:t>6/3/2019</a:t>
             </a:fld>
             <a:endParaRPr lang="en-US" dirty="0"/>
           </a:p>
@@ -374,7 +374,7 @@
             <a:fld id="{5B4AE38D-E020-46F3-803D-8636C5B7B74E}" type="datetimeFigureOut">
               <a:rPr lang="en-US" smtClean="0"/>
               <a:pPr/>
-              <a:t>2/6/2019</a:t>
+              <a:t>6/3/2019</a:t>
             </a:fld>
             <a:endParaRPr lang="en-US" dirty="0"/>
           </a:p>
@@ -1082,7 +1082,7 @@
             <a:fld id="{7DDB771E-4AED-4DD3-8AA1-5D9FD2224F14}" type="datetimeFigureOut">
               <a:rPr lang="en-US" smtClean="0"/>
               <a:pPr/>
-              <a:t>2/6/2019</a:t>
+              <a:t>6/3/2019</a:t>
             </a:fld>
             <a:endParaRPr lang="en-US" dirty="0"/>
           </a:p>
@@ -1249,7 +1249,7 @@
             <a:fld id="{7DDB771E-4AED-4DD3-8AA1-5D9FD2224F14}" type="datetimeFigureOut">
               <a:rPr lang="en-US" smtClean="0"/>
               <a:pPr/>
-              <a:t>2/6/2019</a:t>
+              <a:t>6/3/2019</a:t>
             </a:fld>
             <a:endParaRPr lang="en-US" dirty="0"/>
           </a:p>
@@ -1426,7 +1426,7 @@
             <a:fld id="{7DDB771E-4AED-4DD3-8AA1-5D9FD2224F14}" type="datetimeFigureOut">
               <a:rPr lang="en-US" smtClean="0"/>
               <a:pPr/>
-              <a:t>2/6/2019</a:t>
+              <a:t>6/3/2019</a:t>
             </a:fld>
             <a:endParaRPr lang="en-US" dirty="0"/>
           </a:p>
@@ -1593,7 +1593,7 @@
             <a:fld id="{7DDB771E-4AED-4DD3-8AA1-5D9FD2224F14}" type="datetimeFigureOut">
               <a:rPr lang="en-US" smtClean="0"/>
               <a:pPr/>
-              <a:t>2/6/2019</a:t>
+              <a:t>6/3/2019</a:t>
             </a:fld>
             <a:endParaRPr lang="en-US" dirty="0"/>
           </a:p>
@@ -1836,7 +1836,7 @@
             <a:fld id="{7DDB771E-4AED-4DD3-8AA1-5D9FD2224F14}" type="datetimeFigureOut">
               <a:rPr lang="en-US" smtClean="0"/>
               <a:pPr/>
-              <a:t>2/6/2019</a:t>
+              <a:t>6/3/2019</a:t>
             </a:fld>
             <a:endParaRPr lang="en-US" dirty="0"/>
           </a:p>
@@ -2121,7 +2121,7 @@
             <a:fld id="{7DDB771E-4AED-4DD3-8AA1-5D9FD2224F14}" type="datetimeFigureOut">
               <a:rPr lang="en-US" smtClean="0"/>
               <a:pPr/>
-              <a:t>2/6/2019</a:t>
+              <a:t>6/3/2019</a:t>
             </a:fld>
             <a:endParaRPr lang="en-US" dirty="0"/>
           </a:p>
@@ -2540,7 +2540,7 @@
             <a:fld id="{7DDB771E-4AED-4DD3-8AA1-5D9FD2224F14}" type="datetimeFigureOut">
               <a:rPr lang="en-US" smtClean="0"/>
               <a:pPr/>
-              <a:t>2/6/2019</a:t>
+              <a:t>6/3/2019</a:t>
             </a:fld>
             <a:endParaRPr lang="en-US" dirty="0"/>
           </a:p>
@@ -2655,7 +2655,7 @@
             <a:fld id="{7DDB771E-4AED-4DD3-8AA1-5D9FD2224F14}" type="datetimeFigureOut">
               <a:rPr lang="en-US" smtClean="0"/>
               <a:pPr/>
-              <a:t>2/6/2019</a:t>
+              <a:t>6/3/2019</a:t>
             </a:fld>
             <a:endParaRPr lang="en-US" dirty="0"/>
           </a:p>
@@ -2747,7 +2747,7 @@
             <a:fld id="{7DDB771E-4AED-4DD3-8AA1-5D9FD2224F14}" type="datetimeFigureOut">
               <a:rPr lang="en-US" smtClean="0"/>
               <a:pPr/>
-              <a:t>2/6/2019</a:t>
+              <a:t>6/3/2019</a:t>
             </a:fld>
             <a:endParaRPr lang="en-US" dirty="0"/>
           </a:p>
@@ -3021,7 +3021,7 @@
             <a:fld id="{7DDB771E-4AED-4DD3-8AA1-5D9FD2224F14}" type="datetimeFigureOut">
               <a:rPr lang="en-US" smtClean="0"/>
               <a:pPr/>
-              <a:t>2/6/2019</a:t>
+              <a:t>6/3/2019</a:t>
             </a:fld>
             <a:endParaRPr lang="en-US" dirty="0"/>
           </a:p>
@@ -3271,7 +3271,7 @@
             <a:fld id="{7DDB771E-4AED-4DD3-8AA1-5D9FD2224F14}" type="datetimeFigureOut">
               <a:rPr lang="en-US" smtClean="0"/>
               <a:pPr/>
-              <a:t>2/6/2019</a:t>
+              <a:t>6/3/2019</a:t>
             </a:fld>
             <a:endParaRPr lang="en-US" dirty="0"/>
           </a:p>
@@ -3481,7 +3481,7 @@
             <a:fld id="{7DDB771E-4AED-4DD3-8AA1-5D9FD2224F14}" type="datetimeFigureOut">
               <a:rPr lang="en-US" smtClean="0"/>
               <a:pPr/>
-              <a:t>2/6/2019</a:t>
+              <a:t>6/3/2019</a:t>
             </a:fld>
             <a:endParaRPr lang="en-US" dirty="0"/>
           </a:p>
@@ -3884,43 +3884,6 @@
       </p:grpSpPr>
       <p:sp>
         <p:nvSpPr>
-          <p:cNvPr id="3" name="TextBox 2"/>
-          <p:cNvSpPr txBox="1"/>
-          <p:nvPr/>
-        </p:nvSpPr>
-        <p:spPr>
-          <a:xfrm>
-            <a:off x="2875733" y="3257698"/>
-            <a:ext cx="2951754" cy="646331"/>
-          </a:xfrm>
-          <a:prstGeom prst="rect">
-            <a:avLst/>
-          </a:prstGeom>
-          <a:noFill/>
-        </p:spPr>
-        <p:txBody>
-          <a:bodyPr wrap="square" rtlCol="0">
-            <a:spAutoFit/>
-          </a:bodyPr>
-          <a:lstStyle/>
-          <a:p>
-            <a:pPr algn="ctr"/>
-            <a:r>
-              <a:rPr lang="en-US" dirty="0" smtClean="0"/>
-              <a:t>kirk.kalvar@kal.technology</a:t>
-            </a:r>
-          </a:p>
-          <a:p>
-            <a:pPr algn="ctr"/>
-            <a:r>
-              <a:rPr lang="en-US" dirty="0" smtClean="0"/>
-              <a:t>@kskalvar</a:t>
-            </a:r>
-          </a:p>
-        </p:txBody>
-      </p:sp>
-      <p:sp>
-        <p:nvSpPr>
           <p:cNvPr id="7" name="Title 1"/>
           <p:cNvSpPr txBox="1">
             <a:spLocks/>
@@ -3977,6 +3940,61 @@
               <a:ea typeface="+mj-ea"/>
               <a:cs typeface="+mj-cs"/>
             </a:endParaRPr>
+          </a:p>
+        </p:txBody>
+      </p:sp>
+      <p:sp>
+        <p:nvSpPr>
+          <p:cNvPr id="4" name="TextBox 3"/>
+          <p:cNvSpPr txBox="1"/>
+          <p:nvPr/>
+        </p:nvSpPr>
+        <p:spPr>
+          <a:xfrm>
+            <a:off x="2454378" y="3047386"/>
+            <a:ext cx="3641608" cy="1477328"/>
+          </a:xfrm>
+          <a:prstGeom prst="rect">
+            <a:avLst/>
+          </a:prstGeom>
+          <a:noFill/>
+        </p:spPr>
+        <p:txBody>
+          <a:bodyPr wrap="square" rtlCol="0">
+            <a:spAutoFit/>
+          </a:bodyPr>
+          <a:lstStyle/>
+          <a:p>
+            <a:pPr algn="ctr"/>
+            <a:r>
+              <a:rPr lang="en-US" dirty="0" smtClean="0"/>
+              <a:t>Kirk Kalvar</a:t>
+            </a:r>
+          </a:p>
+          <a:p>
+            <a:pPr algn="ctr"/>
+            <a:r>
+              <a:rPr lang="en-US" dirty="0" smtClean="0"/>
+              <a:t>Senior Software Engineer/Principal</a:t>
+            </a:r>
+          </a:p>
+          <a:p>
+            <a:pPr algn="ctr"/>
+            <a:r>
+              <a:rPr lang="en-US" dirty="0" smtClean="0"/>
+              <a:t>KAL Technology</a:t>
+            </a:r>
+          </a:p>
+          <a:p>
+            <a:pPr algn="ctr"/>
+            <a:endParaRPr lang="en-US" dirty="0" smtClean="0"/>
+          </a:p>
+          <a:p>
+            <a:pPr algn="ctr"/>
+            <a:r>
+              <a:rPr lang="en-US" dirty="0" smtClean="0"/>
+              <a:t>kirk.kalvar@kal.technology</a:t>
+            </a:r>
           </a:p>
         </p:txBody>
       </p:sp>
@@ -4063,13 +4081,8 @@
             </a:pPr>
             <a:r>
               <a:rPr lang="en-US" dirty="0" smtClean="0"/>
-              <a:t>  </a:t>
-            </a:r>
-            <a:r>
-              <a:rPr lang="en-US" dirty="0" smtClean="0"/>
-              <a:t>Cons</a:t>
-            </a:r>
-            <a:endParaRPr lang="en-US" dirty="0" smtClean="0"/>
+              <a:t>  Cons</a:t>
+            </a:r>
           </a:p>
           <a:p>
             <a:pPr lvl="1">
@@ -4082,15 +4095,7 @@
             </a:r>
             <a:r>
               <a:rPr lang="en-US" dirty="0" smtClean="0"/>
-              <a:t> This pipeline </a:t>
-            </a:r>
-            <a:r>
-              <a:rPr lang="en-US" dirty="0" smtClean="0"/>
-              <a:t>currently supports only a Simple Delivery </a:t>
-            </a:r>
-            <a:r>
-              <a:rPr lang="en-US" dirty="0" smtClean="0"/>
-              <a:t>Process</a:t>
+              <a:t> This pipeline currently supports only a Simple Delivery Process</a:t>
             </a:r>
           </a:p>
           <a:p>
@@ -4104,13 +4109,8 @@
             </a:r>
             <a:r>
               <a:rPr lang="en-US" dirty="0" smtClean="0"/>
-              <a:t> Still a lot of manual </a:t>
-            </a:r>
-            <a:r>
-              <a:rPr lang="en-US" dirty="0" smtClean="0"/>
-              <a:t>steps to setup</a:t>
-            </a:r>
-            <a:endParaRPr lang="en-US" dirty="0" smtClean="0"/>
+              <a:t> Still a lot of manual steps to setup</a:t>
+            </a:r>
           </a:p>
           <a:p>
             <a:pPr lvl="1">
@@ -4123,15 +4123,7 @@
             </a:r>
             <a:r>
               <a:rPr lang="en-US" dirty="0" smtClean="0"/>
-              <a:t> </a:t>
-            </a:r>
-            <a:r>
-              <a:rPr lang="en-US" dirty="0" smtClean="0"/>
-              <a:t>Not </a:t>
-            </a:r>
-            <a:r>
-              <a:rPr lang="en-US" dirty="0" smtClean="0"/>
-              <a:t>Production Ready</a:t>
+              <a:t> Not Production Ready</a:t>
             </a:r>
           </a:p>
           <a:p>
@@ -4559,11 +4551,7 @@
             </a:pPr>
             <a:r>
               <a:rPr lang="en-US" dirty="0" smtClean="0"/>
-              <a:t>  </a:t>
-            </a:r>
-            <a:r>
-              <a:rPr lang="en-US" dirty="0" smtClean="0"/>
-              <a:t>Support Team Development</a:t>
+              <a:t>  Support Team Development</a:t>
             </a:r>
           </a:p>
           <a:p>
@@ -4573,11 +4561,7 @@
             </a:pPr>
             <a:r>
               <a:rPr lang="en-US" dirty="0" smtClean="0"/>
-              <a:t>  On </a:t>
-            </a:r>
-            <a:r>
-              <a:rPr lang="en-US" dirty="0" smtClean="0"/>
-              <a:t>Demand Build and Deploy</a:t>
+              <a:t>  On Demand Build and Deploy</a:t>
             </a:r>
           </a:p>
           <a:p>
@@ -4619,8 +4603,13 @@
             </a:r>
             <a:r>
               <a:rPr lang="en-US" dirty="0" smtClean="0"/>
-              <a:t> Modern Software Lifecycle Require It</a:t>
-            </a:r>
+              <a:t> Modern Software Lifecycle </a:t>
+            </a:r>
+            <a:r>
+              <a:rPr lang="en-US" dirty="0" smtClean="0"/>
+              <a:t>Demand It</a:t>
+            </a:r>
+            <a:endParaRPr lang="en-US" dirty="0" smtClean="0"/>
           </a:p>
         </p:txBody>
       </p:sp>
@@ -4759,13 +4748,8 @@
             </a:r>
             <a:r>
               <a:rPr lang="en-US" dirty="0" smtClean="0"/>
-              <a:t> No AWS CodeStar </a:t>
-            </a:r>
-            <a:r>
-              <a:rPr lang="en-US" dirty="0" smtClean="0"/>
-              <a:t>Option</a:t>
-            </a:r>
-            <a:endParaRPr lang="en-US" dirty="0" smtClean="0"/>
+              <a:t> No AWS CodeStar Option</a:t>
+            </a:r>
           </a:p>
           <a:p>
             <a:pPr lvl="1">
@@ -4778,13 +4762,8 @@
             </a:r>
             <a:r>
               <a:rPr lang="en-US" dirty="0" smtClean="0"/>
-              <a:t> Build a Custom Jenkins </a:t>
-            </a:r>
-            <a:r>
-              <a:rPr lang="en-US" dirty="0" smtClean="0"/>
-              <a:t>Pipeline</a:t>
-            </a:r>
-            <a:endParaRPr lang="en-US" dirty="0" smtClean="0"/>
+              <a:t> Build a Custom Jenkins Pipeline</a:t>
+            </a:r>
           </a:p>
           <a:p>
             <a:pPr lvl="1">
@@ -4797,21 +4776,8 @@
             </a:r>
             <a:r>
               <a:rPr lang="en-US" dirty="0" smtClean="0"/>
-              <a:t> Build </a:t>
-            </a:r>
-            <a:r>
-              <a:rPr lang="en-US" dirty="0" smtClean="0"/>
-              <a:t>a Pipeline </a:t>
-            </a:r>
-            <a:r>
-              <a:rPr lang="en-US" dirty="0" smtClean="0"/>
-              <a:t>External or Internal to </a:t>
-            </a:r>
-            <a:r>
-              <a:rPr lang="en-US" dirty="0" smtClean="0"/>
-              <a:t>Kubernetes</a:t>
-            </a:r>
-            <a:endParaRPr lang="en-US" dirty="0" smtClean="0"/>
+              <a:t> Build a Pipeline External or Internal to Kubernetes</a:t>
+            </a:r>
           </a:p>
           <a:p>
             <a:pPr>
@@ -5501,21 +5467,8 @@
             </a:r>
             <a:r>
               <a:rPr lang="en-US" dirty="0" smtClean="0"/>
-              <a:t> Push a simple modification to the </a:t>
-            </a:r>
-            <a:r>
-              <a:rPr lang="en-US" dirty="0" smtClean="0"/>
-              <a:t>AWS </a:t>
-            </a:r>
-            <a:r>
-              <a:rPr lang="en-US" dirty="0" smtClean="0"/>
-              <a:t>CodeCommit </a:t>
-            </a:r>
-            <a:r>
-              <a:rPr lang="en-US" dirty="0" smtClean="0"/>
-              <a:t>Repo</a:t>
-            </a:r>
-            <a:endParaRPr lang="en-US" dirty="0" smtClean="0"/>
+              <a:t> Push a simple modification to the AWS CodeCommit Repo</a:t>
+            </a:r>
           </a:p>
           <a:p>
             <a:pPr lvl="1">

</xml_diff>